<commit_message>
Update pandas cheat sheet
Change-Id: I58511a3214b5bfeb2912ca118fc8021809ad332f
</commit_message>
<xml_diff>
--- a/Pandas_Cheat_Sheet.pptx
+++ b/Pandas_Cheat_Sheet.pptx
@@ -125,7 +125,7 @@
   </p:defaultTextStyle>
   <p:extLst>
     <p:ext uri="{EFAFB233-063F-42B5-8137-9DF3F51BA10A}">
-      <p15:sldGuideLst xmlns:p15="http://schemas.microsoft.com/office/powerpoint/2012/main" xmlns="">
+      <p15:sldGuideLst xmlns:p15="http://schemas.microsoft.com/office/powerpoint/2012/main">
         <p15:guide id="1" orient="horz" pos="2160">
           <p15:clr>
             <a:srgbClr val="A4A3A4"/>
@@ -322,7 +322,7 @@
             <a:fld id="{530820CF-B880-4189-942D-D702A7CBA730}" type="datetimeFigureOut">
               <a:rPr lang="zh-CN" altLang="en-US" smtClean="0"/>
               <a:pPr/>
-              <a:t>2019/12/26</a:t>
+              <a:t>2020/1/16</a:t>
             </a:fld>
             <a:endParaRPr lang="zh-CN" altLang="en-US"/>
           </a:p>
@@ -487,7 +487,7 @@
             <a:fld id="{530820CF-B880-4189-942D-D702A7CBA730}" type="datetimeFigureOut">
               <a:rPr lang="zh-CN" altLang="en-US" smtClean="0"/>
               <a:pPr/>
-              <a:t>2019/12/26</a:t>
+              <a:t>2020/1/16</a:t>
             </a:fld>
             <a:endParaRPr lang="zh-CN" altLang="en-US"/>
           </a:p>
@@ -662,7 +662,7 @@
             <a:fld id="{530820CF-B880-4189-942D-D702A7CBA730}" type="datetimeFigureOut">
               <a:rPr lang="zh-CN" altLang="en-US" smtClean="0"/>
               <a:pPr/>
-              <a:t>2019/12/26</a:t>
+              <a:t>2020/1/16</a:t>
             </a:fld>
             <a:endParaRPr lang="zh-CN" altLang="en-US"/>
           </a:p>
@@ -827,7 +827,7 @@
             <a:fld id="{530820CF-B880-4189-942D-D702A7CBA730}" type="datetimeFigureOut">
               <a:rPr lang="zh-CN" altLang="en-US" smtClean="0"/>
               <a:pPr/>
-              <a:t>2019/12/26</a:t>
+              <a:t>2020/1/16</a:t>
             </a:fld>
             <a:endParaRPr lang="zh-CN" altLang="en-US"/>
           </a:p>
@@ -1069,7 +1069,7 @@
             <a:fld id="{530820CF-B880-4189-942D-D702A7CBA730}" type="datetimeFigureOut">
               <a:rPr lang="zh-CN" altLang="en-US" smtClean="0"/>
               <a:pPr/>
-              <a:t>2019/12/26</a:t>
+              <a:t>2020/1/16</a:t>
             </a:fld>
             <a:endParaRPr lang="zh-CN" altLang="en-US"/>
           </a:p>
@@ -1351,7 +1351,7 @@
             <a:fld id="{530820CF-B880-4189-942D-D702A7CBA730}" type="datetimeFigureOut">
               <a:rPr lang="zh-CN" altLang="en-US" smtClean="0"/>
               <a:pPr/>
-              <a:t>2019/12/26</a:t>
+              <a:t>2020/1/16</a:t>
             </a:fld>
             <a:endParaRPr lang="zh-CN" altLang="en-US"/>
           </a:p>
@@ -1767,7 +1767,7 @@
             <a:fld id="{530820CF-B880-4189-942D-D702A7CBA730}" type="datetimeFigureOut">
               <a:rPr lang="zh-CN" altLang="en-US" smtClean="0"/>
               <a:pPr/>
-              <a:t>2019/12/26</a:t>
+              <a:t>2020/1/16</a:t>
             </a:fld>
             <a:endParaRPr lang="zh-CN" altLang="en-US"/>
           </a:p>
@@ -1881,7 +1881,7 @@
             <a:fld id="{530820CF-B880-4189-942D-D702A7CBA730}" type="datetimeFigureOut">
               <a:rPr lang="zh-CN" altLang="en-US" smtClean="0"/>
               <a:pPr/>
-              <a:t>2019/12/26</a:t>
+              <a:t>2020/1/16</a:t>
             </a:fld>
             <a:endParaRPr lang="zh-CN" altLang="en-US"/>
           </a:p>
@@ -1973,7 +1973,7 @@
             <a:fld id="{530820CF-B880-4189-942D-D702A7CBA730}" type="datetimeFigureOut">
               <a:rPr lang="zh-CN" altLang="en-US" smtClean="0"/>
               <a:pPr/>
-              <a:t>2019/12/26</a:t>
+              <a:t>2020/1/16</a:t>
             </a:fld>
             <a:endParaRPr lang="zh-CN" altLang="en-US"/>
           </a:p>
@@ -2245,7 +2245,7 @@
             <a:fld id="{530820CF-B880-4189-942D-D702A7CBA730}" type="datetimeFigureOut">
               <a:rPr lang="zh-CN" altLang="en-US" smtClean="0"/>
               <a:pPr/>
-              <a:t>2019/12/26</a:t>
+              <a:t>2020/1/16</a:t>
             </a:fld>
             <a:endParaRPr lang="zh-CN" altLang="en-US"/>
           </a:p>
@@ -2494,7 +2494,7 @@
             <a:fld id="{530820CF-B880-4189-942D-D702A7CBA730}" type="datetimeFigureOut">
               <a:rPr lang="zh-CN" altLang="en-US" smtClean="0"/>
               <a:pPr/>
-              <a:t>2019/12/26</a:t>
+              <a:t>2020/1/16</a:t>
             </a:fld>
             <a:endParaRPr lang="zh-CN" altLang="en-US"/>
           </a:p>
@@ -2702,7 +2702,7 @@
             <a:fld id="{530820CF-B880-4189-942D-D702A7CBA730}" type="datetimeFigureOut">
               <a:rPr lang="zh-CN" altLang="en-US" smtClean="0"/>
               <a:pPr/>
-              <a:t>2019/12/26</a:t>
+              <a:t>2020/1/16</a:t>
             </a:fld>
             <a:endParaRPr lang="zh-CN" altLang="en-US"/>
           </a:p>
@@ -3528,7 +3528,7 @@
           <p:cNvPr id="2" name="Title 1">
             <a:extLst>
               <a:ext uri="{FF2B5EF4-FFF2-40B4-BE49-F238E27FC236}">
-                <a16:creationId xmlns:a16="http://schemas.microsoft.com/office/drawing/2014/main" xmlns="" id="{3D5DEDCA-A91F-4E1C-9F56-607D6645AF51}"/>
+                <a16:creationId xmlns:a16="http://schemas.microsoft.com/office/drawing/2014/main" id="{3D5DEDCA-A91F-4E1C-9F56-607D6645AF51}"/>
               </a:ext>
             </a:extLst>
           </p:cNvPr>
@@ -3561,7 +3561,7 @@
           <p:cNvPr id="3" name="Content Placeholder 2">
             <a:extLst>
               <a:ext uri="{FF2B5EF4-FFF2-40B4-BE49-F238E27FC236}">
-                <a16:creationId xmlns:a16="http://schemas.microsoft.com/office/drawing/2014/main" xmlns="" id="{4D7145D0-92E3-4294-941D-1D28C5F13751}"/>
+                <a16:creationId xmlns:a16="http://schemas.microsoft.com/office/drawing/2014/main" id="{4D7145D0-92E3-4294-941D-1D28C5F13751}"/>
               </a:ext>
             </a:extLst>
           </p:cNvPr>
@@ -3670,7 +3670,7 @@
     </p:spTree>
     <p:extLst>
       <p:ext uri="{BB962C8B-B14F-4D97-AF65-F5344CB8AC3E}">
-        <p14:creationId xmlns:p14="http://schemas.microsoft.com/office/powerpoint/2010/main" xmlns="" val="1359580981"/>
+        <p14:creationId xmlns:p14="http://schemas.microsoft.com/office/powerpoint/2010/main" val="1359580981"/>
       </p:ext>
     </p:extLst>
   </p:cSld>
@@ -3702,7 +3702,7 @@
           <p:cNvPr id="2" name="Title 1">
             <a:extLst>
               <a:ext uri="{FF2B5EF4-FFF2-40B4-BE49-F238E27FC236}">
-                <a16:creationId xmlns:a16="http://schemas.microsoft.com/office/drawing/2014/main" xmlns="" id="{1BF769BC-4229-4114-B0FD-32695EB1EA27}"/>
+                <a16:creationId xmlns:a16="http://schemas.microsoft.com/office/drawing/2014/main" id="{1BF769BC-4229-4114-B0FD-32695EB1EA27}"/>
               </a:ext>
             </a:extLst>
           </p:cNvPr>
@@ -3719,7 +3719,7 @@
           <a:lstStyle/>
           <a:p>
             <a:r>
-              <a:rPr lang="en-US" altLang="zh-CN" dirty="0" err="1" smtClean="0"/>
+              <a:rPr lang="en-US" altLang="zh-CN" dirty="0" err="1"/>
               <a:t>DataFrame</a:t>
             </a:r>
             <a:r>
@@ -3739,7 +3739,7 @@
           <p:cNvPr id="3" name="Content Placeholder 2">
             <a:extLst>
               <a:ext uri="{FF2B5EF4-FFF2-40B4-BE49-F238E27FC236}">
-                <a16:creationId xmlns:a16="http://schemas.microsoft.com/office/drawing/2014/main" xmlns="" id="{C20577FB-AFB5-4DD8-97C9-A175FE51C8BF}"/>
+                <a16:creationId xmlns:a16="http://schemas.microsoft.com/office/drawing/2014/main" id="{C20577FB-AFB5-4DD8-97C9-A175FE51C8BF}"/>
               </a:ext>
             </a:extLst>
           </p:cNvPr>
@@ -3808,40 +3808,36 @@
               <a:t>values.tolist</a:t>
             </a:r>
             <a:r>
-              <a:rPr lang="en-US" dirty="0" smtClean="0"/>
+              <a:rPr lang="en-US" dirty="0"/>
               <a:t>()</a:t>
             </a:r>
           </a:p>
           <a:p>
             <a:r>
-              <a:rPr lang="zh-CN" altLang="en-US" dirty="0" smtClean="0"/>
+              <a:rPr lang="zh-CN" altLang="en-US" dirty="0"/>
               <a:t>列转</a:t>
             </a:r>
             <a:r>
-              <a:rPr lang="en-US" altLang="zh-CN" dirty="0" smtClean="0"/>
+              <a:rPr lang="en-US" altLang="zh-CN" dirty="0"/>
               <a:t>List</a:t>
             </a:r>
           </a:p>
           <a:p>
             <a:pPr lvl="1"/>
             <a:r>
-              <a:rPr lang="en-US" dirty="0" err="1" smtClean="0"/>
-              <a:t>d</a:t>
-            </a:r>
-            <a:r>
-              <a:rPr lang="en-US" dirty="0" err="1" smtClean="0"/>
-              <a:t>f</a:t>
-            </a:r>
-            <a:r>
-              <a:rPr lang="en-US" dirty="0" smtClean="0"/>
+              <a:rPr lang="en-US" dirty="0" err="1"/>
+              <a:t>df</a:t>
+            </a:r>
+            <a:r>
+              <a:rPr lang="en-US" dirty="0"/>
               <a:t>[‘column’].</a:t>
             </a:r>
             <a:r>
-              <a:rPr lang="en-US" dirty="0" err="1" smtClean="0"/>
+              <a:rPr lang="en-US" dirty="0" err="1"/>
               <a:t>values.tolist</a:t>
             </a:r>
             <a:r>
-              <a:rPr lang="en-US" smtClean="0"/>
+              <a:rPr lang="en-US"/>
               <a:t>()</a:t>
             </a:r>
             <a:endParaRPr lang="en-US" dirty="0"/>
@@ -3855,7 +3851,7 @@
     </p:spTree>
     <p:extLst>
       <p:ext uri="{BB962C8B-B14F-4D97-AF65-F5344CB8AC3E}">
-        <p14:creationId xmlns:p14="http://schemas.microsoft.com/office/powerpoint/2010/main" xmlns="" val="3308283478"/>
+        <p14:creationId xmlns:p14="http://schemas.microsoft.com/office/powerpoint/2010/main" val="3308283478"/>
       </p:ext>
     </p:extLst>
   </p:cSld>
@@ -4456,7 +4452,7 @@
           <p:cNvPr id="2" name="Title 1">
             <a:extLst>
               <a:ext uri="{FF2B5EF4-FFF2-40B4-BE49-F238E27FC236}">
-                <a16:creationId xmlns:a16="http://schemas.microsoft.com/office/drawing/2014/main" xmlns="" id="{2B5DEDAB-0DD3-4269-A921-90595DCE9E9A}"/>
+                <a16:creationId xmlns:a16="http://schemas.microsoft.com/office/drawing/2014/main" id="{2B5DEDAB-0DD3-4269-A921-90595DCE9E9A}"/>
               </a:ext>
             </a:extLst>
           </p:cNvPr>
@@ -4481,7 +4477,7 @@
           <p:cNvPr id="3" name="Content Placeholder 2">
             <a:extLst>
               <a:ext uri="{FF2B5EF4-FFF2-40B4-BE49-F238E27FC236}">
-                <a16:creationId xmlns:a16="http://schemas.microsoft.com/office/drawing/2014/main" xmlns="" id="{57A4E6F1-8B37-413E-A9AE-EA39842F900C}"/>
+                <a16:creationId xmlns:a16="http://schemas.microsoft.com/office/drawing/2014/main" id="{57A4E6F1-8B37-413E-A9AE-EA39842F900C}"/>
               </a:ext>
             </a:extLst>
           </p:cNvPr>
@@ -4504,7 +4500,7 @@
     </p:spTree>
     <p:extLst>
       <p:ext uri="{BB962C8B-B14F-4D97-AF65-F5344CB8AC3E}">
-        <p14:creationId xmlns:p14="http://schemas.microsoft.com/office/powerpoint/2010/main" xmlns="" val="2831842387"/>
+        <p14:creationId xmlns:p14="http://schemas.microsoft.com/office/powerpoint/2010/main" val="2831842387"/>
       </p:ext>
     </p:extLst>
   </p:cSld>
@@ -5186,7 +5182,7 @@
           <p:cNvPr id="2" name="Title 1">
             <a:extLst>
               <a:ext uri="{FF2B5EF4-FFF2-40B4-BE49-F238E27FC236}">
-                <a16:creationId xmlns:a16="http://schemas.microsoft.com/office/drawing/2014/main" xmlns="" id="{C9CDCE50-ED31-421E-839F-CC4C85BEF5FF}"/>
+                <a16:creationId xmlns:a16="http://schemas.microsoft.com/office/drawing/2014/main" id="{C9CDCE50-ED31-421E-839F-CC4C85BEF5FF}"/>
               </a:ext>
             </a:extLst>
           </p:cNvPr>
@@ -5227,7 +5223,7 @@
           <p:cNvPr id="3" name="Content Placeholder 2">
             <a:extLst>
               <a:ext uri="{FF2B5EF4-FFF2-40B4-BE49-F238E27FC236}">
-                <a16:creationId xmlns:a16="http://schemas.microsoft.com/office/drawing/2014/main" xmlns="" id="{73D2D912-3AD3-4656-BC5D-38DA3D71C239}"/>
+                <a16:creationId xmlns:a16="http://schemas.microsoft.com/office/drawing/2014/main" id="{73D2D912-3AD3-4656-BC5D-38DA3D71C239}"/>
               </a:ext>
             </a:extLst>
           </p:cNvPr>
@@ -5331,7 +5327,7 @@
     </p:spTree>
     <p:extLst>
       <p:ext uri="{BB962C8B-B14F-4D97-AF65-F5344CB8AC3E}">
-        <p14:creationId xmlns:p14="http://schemas.microsoft.com/office/powerpoint/2010/main" xmlns="" val="524410915"/>
+        <p14:creationId xmlns:p14="http://schemas.microsoft.com/office/powerpoint/2010/main" val="524410915"/>
       </p:ext>
     </p:extLst>
   </p:cSld>
@@ -5753,6 +5749,34 @@
               <a:rPr lang="en-US" altLang="zh-CN" dirty="0"/>
               <a:t>s[]</a:t>
             </a:r>
+          </a:p>
+          <a:p>
+            <a:pPr lvl="1"/>
+            <a:r>
+              <a:rPr lang="zh-CN" altLang="en-US" dirty="0"/>
+              <a:t>取第</a:t>
+            </a:r>
+            <a:r>
+              <a:rPr lang="en-US" altLang="zh-CN" dirty="0"/>
+              <a:t>N</a:t>
+            </a:r>
+            <a:r>
+              <a:rPr lang="zh-CN" altLang="en-US" dirty="0"/>
+              <a:t>个：</a:t>
+            </a:r>
+            <a:r>
+              <a:rPr lang="en-US" altLang="zh-CN" dirty="0" err="1"/>
+              <a:t>s</a:t>
+            </a:r>
+            <a:r>
+              <a:rPr lang="en-US" dirty="0" err="1"/>
+              <a:t>.tolist</a:t>
+            </a:r>
+            <a:r>
+              <a:rPr lang="en-US"/>
+              <a:t>()[N]</a:t>
+            </a:r>
+            <a:endParaRPr lang="en-US" altLang="zh-CN" dirty="0"/>
           </a:p>
         </p:txBody>
       </p:sp>

</xml_diff>

<commit_message>
Update dataframe group merge operation.
Change-Id: I6c445b801574b02bfd80b296dd0727f9ff4ac2a5
</commit_message>
<xml_diff>
--- a/Pandas_Cheat_Sheet.pptx
+++ b/Pandas_Cheat_Sheet.pptx
@@ -322,7 +322,7 @@
             <a:fld id="{530820CF-B880-4189-942D-D702A7CBA730}" type="datetimeFigureOut">
               <a:rPr lang="zh-CN" altLang="en-US" smtClean="0"/>
               <a:pPr/>
-              <a:t>2020/1/16</a:t>
+              <a:t>2020/2/24</a:t>
             </a:fld>
             <a:endParaRPr lang="zh-CN" altLang="en-US"/>
           </a:p>
@@ -487,7 +487,7 @@
             <a:fld id="{530820CF-B880-4189-942D-D702A7CBA730}" type="datetimeFigureOut">
               <a:rPr lang="zh-CN" altLang="en-US" smtClean="0"/>
               <a:pPr/>
-              <a:t>2020/1/16</a:t>
+              <a:t>2020/2/24</a:t>
             </a:fld>
             <a:endParaRPr lang="zh-CN" altLang="en-US"/>
           </a:p>
@@ -662,7 +662,7 @@
             <a:fld id="{530820CF-B880-4189-942D-D702A7CBA730}" type="datetimeFigureOut">
               <a:rPr lang="zh-CN" altLang="en-US" smtClean="0"/>
               <a:pPr/>
-              <a:t>2020/1/16</a:t>
+              <a:t>2020/2/24</a:t>
             </a:fld>
             <a:endParaRPr lang="zh-CN" altLang="en-US"/>
           </a:p>
@@ -827,7 +827,7 @@
             <a:fld id="{530820CF-B880-4189-942D-D702A7CBA730}" type="datetimeFigureOut">
               <a:rPr lang="zh-CN" altLang="en-US" smtClean="0"/>
               <a:pPr/>
-              <a:t>2020/1/16</a:t>
+              <a:t>2020/2/24</a:t>
             </a:fld>
             <a:endParaRPr lang="zh-CN" altLang="en-US"/>
           </a:p>
@@ -1069,7 +1069,7 @@
             <a:fld id="{530820CF-B880-4189-942D-D702A7CBA730}" type="datetimeFigureOut">
               <a:rPr lang="zh-CN" altLang="en-US" smtClean="0"/>
               <a:pPr/>
-              <a:t>2020/1/16</a:t>
+              <a:t>2020/2/24</a:t>
             </a:fld>
             <a:endParaRPr lang="zh-CN" altLang="en-US"/>
           </a:p>
@@ -1351,7 +1351,7 @@
             <a:fld id="{530820CF-B880-4189-942D-D702A7CBA730}" type="datetimeFigureOut">
               <a:rPr lang="zh-CN" altLang="en-US" smtClean="0"/>
               <a:pPr/>
-              <a:t>2020/1/16</a:t>
+              <a:t>2020/2/24</a:t>
             </a:fld>
             <a:endParaRPr lang="zh-CN" altLang="en-US"/>
           </a:p>
@@ -1767,7 +1767,7 @@
             <a:fld id="{530820CF-B880-4189-942D-D702A7CBA730}" type="datetimeFigureOut">
               <a:rPr lang="zh-CN" altLang="en-US" smtClean="0"/>
               <a:pPr/>
-              <a:t>2020/1/16</a:t>
+              <a:t>2020/2/24</a:t>
             </a:fld>
             <a:endParaRPr lang="zh-CN" altLang="en-US"/>
           </a:p>
@@ -1881,7 +1881,7 @@
             <a:fld id="{530820CF-B880-4189-942D-D702A7CBA730}" type="datetimeFigureOut">
               <a:rPr lang="zh-CN" altLang="en-US" smtClean="0"/>
               <a:pPr/>
-              <a:t>2020/1/16</a:t>
+              <a:t>2020/2/24</a:t>
             </a:fld>
             <a:endParaRPr lang="zh-CN" altLang="en-US"/>
           </a:p>
@@ -1973,7 +1973,7 @@
             <a:fld id="{530820CF-B880-4189-942D-D702A7CBA730}" type="datetimeFigureOut">
               <a:rPr lang="zh-CN" altLang="en-US" smtClean="0"/>
               <a:pPr/>
-              <a:t>2020/1/16</a:t>
+              <a:t>2020/2/24</a:t>
             </a:fld>
             <a:endParaRPr lang="zh-CN" altLang="en-US"/>
           </a:p>
@@ -2245,7 +2245,7 @@
             <a:fld id="{530820CF-B880-4189-942D-D702A7CBA730}" type="datetimeFigureOut">
               <a:rPr lang="zh-CN" altLang="en-US" smtClean="0"/>
               <a:pPr/>
-              <a:t>2020/1/16</a:t>
+              <a:t>2020/2/24</a:t>
             </a:fld>
             <a:endParaRPr lang="zh-CN" altLang="en-US"/>
           </a:p>
@@ -2494,7 +2494,7 @@
             <a:fld id="{530820CF-B880-4189-942D-D702A7CBA730}" type="datetimeFigureOut">
               <a:rPr lang="zh-CN" altLang="en-US" smtClean="0"/>
               <a:pPr/>
-              <a:t>2020/1/16</a:t>
+              <a:t>2020/2/24</a:t>
             </a:fld>
             <a:endParaRPr lang="zh-CN" altLang="en-US"/>
           </a:p>
@@ -2702,7 +2702,7 @@
             <a:fld id="{530820CF-B880-4189-942D-D702A7CBA730}" type="datetimeFigureOut">
               <a:rPr lang="zh-CN" altLang="en-US" smtClean="0"/>
               <a:pPr/>
-              <a:t>2020/1/16</a:t>
+              <a:t>2020/2/24</a:t>
             </a:fld>
             <a:endParaRPr lang="zh-CN" altLang="en-US"/>
           </a:p>
@@ -3595,7 +3595,7 @@
             <a:pPr lvl="2"/>
             <a:r>
               <a:rPr lang="en-US" dirty="0"/>
-              <a:t>df[‘column name’]</a:t>
+              <a:t>df['column name']</a:t>
             </a:r>
           </a:p>
           <a:p>
@@ -3610,7 +3610,7 @@
             <a:pPr lvl="2"/>
             <a:r>
               <a:rPr lang="en-US" dirty="0"/>
-              <a:t>df[[‘column A’, ‘column B’]]</a:t>
+              <a:t>df[['column A', 'column B']]</a:t>
             </a:r>
           </a:p>
           <a:p>
@@ -3825,22 +3825,17 @@
           <a:p>
             <a:pPr lvl="1"/>
             <a:r>
-              <a:rPr lang="en-US" dirty="0" err="1"/>
-              <a:t>df</a:t>
-            </a:r>
-            <a:r>
               <a:rPr lang="en-US" dirty="0"/>
-              <a:t>[‘column’].</a:t>
+              <a:t>df['column'].</a:t>
             </a:r>
             <a:r>
               <a:rPr lang="en-US" dirty="0" err="1"/>
               <a:t>values.tolist</a:t>
             </a:r>
             <a:r>
-              <a:rPr lang="en-US"/>
+              <a:rPr lang="en-US" dirty="0"/>
               <a:t>()</a:t>
             </a:r>
-            <a:endParaRPr lang="en-US" dirty="0"/>
           </a:p>
           <a:p>
             <a:pPr lvl="1"/>
@@ -3922,20 +3917,8 @@
           <a:lstStyle/>
           <a:p>
             <a:r>
-              <a:rPr lang="en-US" altLang="en-US" sz="2400" dirty="0" err="1"/>
-              <a:t>df</a:t>
-            </a:r>
-            <a:r>
               <a:rPr lang="en-US" altLang="en-US" sz="2400" dirty="0"/>
-              <a:t>[</a:t>
-            </a:r>
-            <a:r>
-              <a:rPr lang="en-US" altLang="en-US" sz="2400" dirty="0" err="1"/>
-              <a:t>df</a:t>
-            </a:r>
-            <a:r>
-              <a:rPr lang="en-US" altLang="en-US" sz="2400" dirty="0"/>
-              <a:t>[‘column1’]&gt;100]</a:t>
+              <a:t>df[df['column1']&gt;100]</a:t>
             </a:r>
           </a:p>
           <a:p>
@@ -3969,7 +3952,7 @@
             </a:r>
             <a:r>
               <a:rPr lang="en-US" altLang="zh-CN" sz="2400" dirty="0"/>
-              <a:t>‘</a:t>
+              <a:t>'</a:t>
             </a:r>
             <a:r>
               <a:rPr lang="en-US" altLang="en-US" sz="2400" dirty="0"/>
@@ -3977,7 +3960,7 @@
             </a:r>
             <a:r>
               <a:rPr lang="pt-BR" altLang="zh-CN" sz="2400" dirty="0"/>
-              <a:t>’, ‘</a:t>
+              <a:t>', '</a:t>
             </a:r>
             <a:r>
               <a:rPr lang="en-US" altLang="en-US" sz="2400" dirty="0"/>
@@ -3985,7 +3968,7 @@
             </a:r>
             <a:r>
               <a:rPr lang="pt-BR" altLang="zh-CN" sz="2400" dirty="0"/>
-              <a:t>’]][</a:t>
+              <a:t>']][</a:t>
             </a:r>
             <a:r>
               <a:rPr lang="en-US" altLang="zh-CN" sz="2400" dirty="0" err="1"/>
@@ -4033,20 +4016,8 @@
           </a:p>
           <a:p>
             <a:r>
-              <a:rPr lang="en-US" altLang="zh-CN" sz="2400" dirty="0" err="1"/>
-              <a:t>df</a:t>
-            </a:r>
-            <a:r>
               <a:rPr lang="en-US" altLang="zh-CN" sz="2400" dirty="0"/>
-              <a:t>[</a:t>
-            </a:r>
-            <a:r>
-              <a:rPr lang="en-US" altLang="zh-CN" sz="2400" dirty="0" err="1"/>
-              <a:t>df</a:t>
-            </a:r>
-            <a:r>
-              <a:rPr lang="en-US" altLang="zh-CN" sz="2400" dirty="0"/>
-              <a:t>[‘columns1’].</a:t>
+              <a:t>df[df['columns1'].</a:t>
             </a:r>
             <a:r>
               <a:rPr lang="en-US" altLang="zh-CN" sz="2400" dirty="0" err="1"/>
@@ -4117,28 +4088,8 @@
           </a:p>
           <a:p>
             <a:r>
-              <a:rPr lang="en-US" altLang="en-US" sz="2400" dirty="0" err="1"/>
-              <a:t>df</a:t>
-            </a:r>
-            <a:r>
               <a:rPr lang="en-US" altLang="en-US" sz="2400" dirty="0"/>
-              <a:t>[(</a:t>
-            </a:r>
-            <a:r>
-              <a:rPr lang="en-US" altLang="en-US" sz="2400" dirty="0" err="1"/>
-              <a:t>df</a:t>
-            </a:r>
-            <a:r>
-              <a:rPr lang="en-US" altLang="en-US" sz="2400" dirty="0"/>
-              <a:t>[‘column1’]&gt;100) &amp; (</a:t>
-            </a:r>
-            <a:r>
-              <a:rPr lang="en-US" altLang="en-US" sz="2400" dirty="0" err="1"/>
-              <a:t>df</a:t>
-            </a:r>
-            <a:r>
-              <a:rPr lang="en-US" altLang="en-US" sz="2400" dirty="0"/>
-              <a:t>[‘column1’].</a:t>
+              <a:t>df[(df['column1']&gt;100) &amp; (df['column1'].</a:t>
             </a:r>
             <a:r>
               <a:rPr lang="en-US" altLang="en-US" sz="2400" dirty="0" err="1"/>
@@ -4308,15 +4259,7 @@
             <a:pPr lvl="1"/>
             <a:r>
               <a:rPr lang="en-US" altLang="zh-CN" sz="2000" dirty="0"/>
-              <a:t> </a:t>
-            </a:r>
-            <a:r>
-              <a:rPr lang="en-US" altLang="zh-CN" sz="2000" dirty="0" err="1"/>
-              <a:t>df</a:t>
-            </a:r>
-            <a:r>
-              <a:rPr lang="en-US" altLang="zh-CN" sz="2000" dirty="0"/>
-              <a:t>[‘new'] = </a:t>
+              <a:t> df['new'] = </a:t>
             </a:r>
             <a:r>
               <a:rPr lang="en-US" altLang="zh-CN" sz="2000" dirty="0" err="1"/>
@@ -4354,15 +4297,7 @@
             <a:pPr lvl="1"/>
             <a:r>
               <a:rPr lang="en-US" altLang="zh-CN" sz="1800" dirty="0"/>
-              <a:t>del </a:t>
-            </a:r>
-            <a:r>
-              <a:rPr lang="en-US" altLang="zh-CN" sz="1800" dirty="0" err="1"/>
-              <a:t>df</a:t>
-            </a:r>
-            <a:r>
-              <a:rPr lang="en-US" altLang="zh-CN" sz="1800" dirty="0"/>
-              <a:t>[‘a’]    # </a:t>
+              <a:t>del df['a']    # </a:t>
             </a:r>
             <a:r>
               <a:rPr lang="zh-CN" altLang="en-US" sz="1800" dirty="0"/>
@@ -4382,7 +4317,7 @@
             </a:r>
             <a:r>
               <a:rPr lang="en-US" altLang="zh-CN" sz="1800" dirty="0"/>
-              <a:t>([‘a’],axis=1)    # </a:t>
+              <a:t>(['a'],axis=1)    # </a:t>
             </a:r>
             <a:r>
               <a:rPr lang="zh-CN" altLang="en-US" sz="1800" dirty="0"/>
@@ -4637,12 +4572,8 @@
           </a:p>
           <a:p>
             <a:r>
-              <a:rPr lang="en-US" sz="2800" dirty="0" err="1"/>
-              <a:t>df</a:t>
-            </a:r>
-            <a:r>
               <a:rPr lang="en-US" sz="2800" dirty="0"/>
-              <a:t>[‘column’] = xxx </a:t>
+              <a:t>df['column'] = xxx </a:t>
             </a:r>
             <a:r>
               <a:rPr lang="en-US" altLang="zh-CN" sz="2800" dirty="0"/>
@@ -4998,9 +4929,285 @@
           <a:lstStyle/>
           <a:p>
             <a:r>
-              <a:rPr lang="zh-CN" altLang="en-US" dirty="0"/>
-              <a:t>去重</a:t>
-            </a:r>
+              <a:rPr lang="zh-CN" altLang="en-US" sz="2400" dirty="0"/>
+              <a:t>将两列组成一个</a:t>
+            </a:r>
+            <a:r>
+              <a:rPr lang="en-US" altLang="zh-CN" sz="2400" dirty="0" err="1"/>
+              <a:t>dict</a:t>
+            </a:r>
+            <a:endParaRPr lang="en-US" altLang="zh-CN" sz="2400" dirty="0"/>
+          </a:p>
+          <a:p>
+            <a:pPr lvl="1"/>
+            <a:r>
+              <a:rPr lang="en-US" altLang="zh-CN" sz="1600" dirty="0"/>
+              <a:t>df['merged'] = [{key: </a:t>
+            </a:r>
+            <a:r>
+              <a:rPr lang="en-US" altLang="zh-CN" sz="1600" dirty="0" err="1"/>
+              <a:t>val</a:t>
+            </a:r>
+            <a:r>
+              <a:rPr lang="en-US" altLang="zh-CN" sz="1600" dirty="0"/>
+              <a:t>} for key, </a:t>
+            </a:r>
+            <a:r>
+              <a:rPr lang="en-US" altLang="zh-CN" sz="1600" dirty="0" err="1"/>
+              <a:t>val</a:t>
+            </a:r>
+            <a:r>
+              <a:rPr lang="en-US" altLang="zh-CN" sz="1600" dirty="0"/>
+              <a:t> in zip(</a:t>
+            </a:r>
+            <a:r>
+              <a:rPr lang="en-US" altLang="zh-CN" sz="1600" dirty="0" err="1"/>
+              <a:t>df.colomn_a</a:t>
+            </a:r>
+            <a:r>
+              <a:rPr lang="en-US" altLang="zh-CN" sz="1600" dirty="0"/>
+              <a:t>, df.column_b)]</a:t>
+            </a:r>
+          </a:p>
+          <a:p>
+            <a:pPr lvl="1"/>
+            <a:r>
+              <a:rPr lang="en-US" altLang="zh-CN" sz="1600" dirty="0"/>
+              <a:t>df['merged'] = </a:t>
+            </a:r>
+            <a:r>
+              <a:rPr lang="en-US" altLang="zh-CN" sz="1600" dirty="0" err="1"/>
+              <a:t>df.apply</a:t>
+            </a:r>
+            <a:r>
+              <a:rPr lang="en-US" altLang="zh-CN" sz="1600" dirty="0"/>
+              <a:t>(lambda row: {row['</a:t>
+            </a:r>
+            <a:r>
+              <a:rPr lang="en-US" altLang="zh-CN" sz="1600" dirty="0" err="1"/>
+              <a:t>colomn_a</a:t>
+            </a:r>
+            <a:r>
+              <a:rPr lang="en-US" altLang="zh-CN" sz="1600" dirty="0"/>
+              <a:t>']:row['</a:t>
+            </a:r>
+            <a:r>
+              <a:rPr lang="en-US" altLang="zh-CN" sz="1600" dirty="0" err="1"/>
+              <a:t>column_b</a:t>
+            </a:r>
+            <a:r>
+              <a:rPr lang="en-US" altLang="zh-CN" sz="1600" dirty="0"/>
+              <a:t>']}, axis=1)</a:t>
+            </a:r>
+          </a:p>
+          <a:p>
+            <a:r>
+              <a:rPr lang="zh-CN" altLang="en-US" sz="2400" dirty="0"/>
+              <a:t>将两列</a:t>
+            </a:r>
+            <a:r>
+              <a:rPr lang="en-US" altLang="zh-CN" sz="2400" dirty="0" err="1"/>
+              <a:t>dict</a:t>
+            </a:r>
+            <a:r>
+              <a:rPr lang="zh-CN" altLang="en-US" sz="2400" dirty="0"/>
+              <a:t>按</a:t>
+            </a:r>
+            <a:r>
+              <a:rPr lang="en-US" altLang="zh-CN" sz="2400" dirty="0" err="1"/>
+              <a:t>groupby</a:t>
+            </a:r>
+            <a:r>
+              <a:rPr lang="zh-CN" altLang="en-US" sz="2400" dirty="0"/>
+              <a:t>合并成整个</a:t>
+            </a:r>
+            <a:r>
+              <a:rPr lang="en-US" altLang="zh-CN" sz="2400" dirty="0" err="1"/>
+              <a:t>dict</a:t>
+            </a:r>
+            <a:endParaRPr lang="en-US" altLang="zh-CN" sz="2400" dirty="0"/>
+          </a:p>
+          <a:p>
+            <a:pPr lvl="1"/>
+            <a:r>
+              <a:rPr lang="en-US" altLang="zh-CN" sz="1800" dirty="0"/>
+              <a:t>def </a:t>
+            </a:r>
+            <a:r>
+              <a:rPr lang="en-US" altLang="zh-CN" sz="1800" dirty="0" err="1"/>
+              <a:t>merge_dicts</a:t>
+            </a:r>
+            <a:r>
+              <a:rPr lang="en-US" altLang="zh-CN" sz="1800" dirty="0"/>
+              <a:t>(x): return {k: v for d in </a:t>
+            </a:r>
+            <a:r>
+              <a:rPr lang="en-US" altLang="zh-CN" sz="1800" dirty="0" err="1"/>
+              <a:t>x.dropna</a:t>
+            </a:r>
+            <a:r>
+              <a:rPr lang="en-US" altLang="zh-CN" sz="1800" dirty="0"/>
+              <a:t>() for k, v in </a:t>
+            </a:r>
+            <a:r>
+              <a:rPr lang="en-US" altLang="zh-CN" sz="1800" dirty="0" err="1"/>
+              <a:t>d.items</a:t>
+            </a:r>
+            <a:r>
+              <a:rPr lang="en-US" altLang="zh-CN" sz="1800" dirty="0"/>
+              <a:t>()}</a:t>
+            </a:r>
+          </a:p>
+          <a:p>
+            <a:pPr lvl="1"/>
+            <a:r>
+              <a:rPr lang="en-US" altLang="zh-CN" sz="1800" dirty="0" err="1"/>
+              <a:t>df.groupby</a:t>
+            </a:r>
+            <a:r>
+              <a:rPr lang="en-US" altLang="zh-CN" sz="1800" dirty="0"/>
+              <a:t>([‘</a:t>
+            </a:r>
+            <a:r>
+              <a:rPr lang="en-US" altLang="zh-CN" sz="1800" dirty="0" err="1"/>
+              <a:t>column_a</a:t>
+            </a:r>
+            <a:r>
+              <a:rPr lang="en-US" altLang="zh-CN" sz="1800" dirty="0"/>
+              <a:t>', ‘</a:t>
+            </a:r>
+            <a:r>
+              <a:rPr lang="en-US" altLang="zh-CN" sz="1800" dirty="0" err="1"/>
+              <a:t>column_b</a:t>
+            </a:r>
+            <a:r>
+              <a:rPr lang="en-US" altLang="zh-CN" sz="1800" dirty="0"/>
+              <a:t>'], </a:t>
+            </a:r>
+            <a:r>
+              <a:rPr lang="en-US" altLang="zh-CN" sz="1800" dirty="0" err="1"/>
+              <a:t>as_index</a:t>
+            </a:r>
+            <a:r>
+              <a:rPr lang="en-US" altLang="zh-CN" sz="1800" dirty="0"/>
+              <a:t>=False).</a:t>
+            </a:r>
+            <a:r>
+              <a:rPr lang="en-US" altLang="zh-CN" sz="1800" dirty="0" err="1"/>
+              <a:t>agg</a:t>
+            </a:r>
+            <a:r>
+              <a:rPr lang="en-US" altLang="zh-CN" sz="1800" dirty="0"/>
+              <a:t>(</a:t>
+            </a:r>
+            <a:r>
+              <a:rPr lang="en-US" altLang="zh-CN" sz="1800" dirty="0" err="1"/>
+              <a:t>merge_dicts</a:t>
+            </a:r>
+            <a:r>
+              <a:rPr lang="en-US" altLang="zh-CN" sz="1800" dirty="0"/>
+              <a:t>)</a:t>
+            </a:r>
+          </a:p>
+          <a:p>
+            <a:pPr lvl="1"/>
+            <a:r>
+              <a:rPr lang="en-US" altLang="zh-CN" sz="1800" dirty="0">
+                <a:hlinkClick r:id="rId2"/>
+              </a:rPr>
+              <a:t>https://stackoverflow.com/a/52783558/12929244</a:t>
+            </a:r>
+            <a:endParaRPr lang="en-US" altLang="zh-CN" sz="1800" dirty="0"/>
+          </a:p>
+          <a:p>
+            <a:r>
+              <a:rPr lang="zh-CN" altLang="en-US" sz="2400" dirty="0"/>
+              <a:t>将两列数据</a:t>
+            </a:r>
+            <a:r>
+              <a:rPr lang="en-US" altLang="zh-CN" sz="2400" dirty="0" err="1"/>
+              <a:t>groupby</a:t>
+            </a:r>
+            <a:r>
+              <a:rPr lang="zh-CN" altLang="en-US" sz="2400" dirty="0"/>
+              <a:t>按列合并成</a:t>
+            </a:r>
+            <a:r>
+              <a:rPr lang="en-US" altLang="zh-CN" sz="2400" dirty="0"/>
+              <a:t>list</a:t>
+            </a:r>
+          </a:p>
+          <a:p>
+            <a:pPr lvl="1"/>
+            <a:r>
+              <a:rPr lang="en-US" altLang="zh-CN" sz="1800" dirty="0" err="1"/>
+              <a:t>df.groupby</a:t>
+            </a:r>
+            <a:r>
+              <a:rPr lang="en-US" altLang="zh-CN" sz="1800" dirty="0"/>
+              <a:t>(‘</a:t>
+            </a:r>
+            <a:r>
+              <a:rPr lang="en-US" altLang="zh-CN" sz="1800" dirty="0" err="1"/>
+              <a:t>column_a</a:t>
+            </a:r>
+            <a:r>
+              <a:rPr lang="en-US" altLang="zh-CN" sz="1800" dirty="0"/>
+              <a:t>').</a:t>
+            </a:r>
+            <a:r>
+              <a:rPr lang="en-US" altLang="zh-CN" sz="1800" dirty="0" err="1"/>
+              <a:t>agg</a:t>
+            </a:r>
+            <a:r>
+              <a:rPr lang="en-US" altLang="zh-CN" sz="1800" dirty="0"/>
+              <a:t>(lambda x: list(x))</a:t>
+            </a:r>
+          </a:p>
+          <a:p>
+            <a:pPr lvl="1"/>
+            <a:r>
+              <a:rPr lang="en-US" altLang="zh-CN" sz="1800" dirty="0" err="1"/>
+              <a:t>df.groupby</a:t>
+            </a:r>
+            <a:r>
+              <a:rPr lang="en-US" altLang="zh-CN" sz="1800" dirty="0"/>
+              <a:t>(‘</a:t>
+            </a:r>
+            <a:r>
+              <a:rPr lang="en-US" altLang="zh-CN" sz="1800" dirty="0" err="1"/>
+              <a:t>column_a</a:t>
+            </a:r>
+            <a:r>
+              <a:rPr lang="en-US" altLang="zh-CN" sz="1800" dirty="0"/>
+              <a:t>').</a:t>
+            </a:r>
+            <a:r>
+              <a:rPr lang="en-US" altLang="zh-CN" sz="1800" dirty="0" err="1"/>
+              <a:t>agg</a:t>
+            </a:r>
+            <a:r>
+              <a:rPr lang="en-US" altLang="zh-CN" sz="1800" dirty="0"/>
+              <a:t>(</a:t>
+            </a:r>
+            <a:r>
+              <a:rPr lang="en-US" altLang="zh-CN" sz="1800" dirty="0" err="1"/>
+              <a:t>pd.Series.tolist</a:t>
+            </a:r>
+            <a:r>
+              <a:rPr lang="en-US" altLang="zh-CN" sz="1800" dirty="0"/>
+              <a:t>)</a:t>
+            </a:r>
+          </a:p>
+          <a:p>
+            <a:pPr lvl="1"/>
+            <a:r>
+              <a:rPr lang="en-US" sz="1800" dirty="0">
+                <a:hlinkClick r:id="rId3"/>
+              </a:rPr>
+              <a:t>https://stackoverflow.com/a/55839464/12929244</a:t>
+            </a:r>
+            <a:endParaRPr lang="en-US" sz="1800" dirty="0"/>
           </a:p>
         </p:txBody>
       </p:sp>
@@ -5453,7 +5660,7 @@
             </a:r>
             <a:r>
               <a:rPr lang="en-US" dirty="0"/>
-              <a:t> ([1, 2, ‘three’, 3.14, -5])</a:t>
+              <a:t> ([1, 2, 'three', 3.14, -5])</a:t>
             </a:r>
           </a:p>
           <a:p>
@@ -5468,15 +5675,7 @@
             </a:r>
             <a:r>
               <a:rPr lang="en-US" dirty="0"/>
-              <a:t>(</a:t>
-            </a:r>
-            <a:r>
-              <a:rPr lang="en-US" dirty="0" err="1"/>
-              <a:t>tuple</a:t>
-            </a:r>
-            <a:r>
-              <a:rPr lang="en-US" dirty="0"/>
-              <a:t>(‘</a:t>
+              <a:t>(tuple('</a:t>
             </a:r>
             <a:r>
               <a:rPr lang="en-US" dirty="0" err="1"/>
@@ -5484,7 +5683,7 @@
             </a:r>
             <a:r>
               <a:rPr lang="en-US" dirty="0"/>
-              <a:t>’))</a:t>
+              <a:t>'))</a:t>
             </a:r>
           </a:p>
           <a:p>
@@ -5540,15 +5739,7 @@
             </a:r>
             <a:r>
               <a:rPr lang="en-US" dirty="0"/>
-              <a:t>': 20, '</a:t>
-            </a:r>
-            <a:r>
-              <a:rPr lang="en-US" dirty="0" err="1"/>
-              <a:t>ccc</a:t>
-            </a:r>
-            <a:r>
-              <a:rPr lang="en-US" dirty="0"/>
-              <a:t>': 30, '</a:t>
+              <a:t>': 20, 'ccc': 30, '</a:t>
             </a:r>
             <a:r>
               <a:rPr lang="en-US" dirty="0" err="1"/>
@@ -6496,7 +6687,7 @@
             </a:r>
             <a:r>
               <a:rPr lang="en-US" altLang="zh-CN" sz="1800" dirty="0"/>
-              <a:t>(columns=[‘A’, ‘B’, ‘C’, ‘D’])    # </a:t>
+              <a:t>(columns=['A', 'B', 'C', 'D'])    # </a:t>
             </a:r>
             <a:r>
               <a:rPr lang="zh-CN" altLang="en-US" sz="1800" dirty="0"/>
@@ -6607,7 +6798,7 @@
             </a:r>
             <a:r>
               <a:rPr lang="en-US" altLang="zh-CN" sz="2200" dirty="0"/>
-              <a:t>({'c':['1','2'],'a':[‘3',‘4']})</a:t>
+              <a:t>({'c':['1','2'],'a':['3','4']})</a:t>
             </a:r>
           </a:p>
           <a:p>
@@ -6681,7 +6872,7 @@
             </a:r>
             <a:r>
               <a:rPr lang="en-US" altLang="zh-CN" sz="2200" dirty="0"/>
-              <a:t>({‘a’: {2020: 1, 2021: 2}, ‘b': {2020: 3, 2021: 4}})</a:t>
+              <a:t>({'a': {2020: 1, 2021: 2}, 'b': {2020: 3, 2021: 4}})</a:t>
             </a:r>
           </a:p>
           <a:p>

</xml_diff>